<commit_message>
Hands On Demos - Day 4.
</commit_message>
<xml_diff>
--- a/1. Core Java 8/Day 4/Slides/10. Nested Types and Anonymous Classes/nested-types-and-anonymous-classes-slides.pptx
+++ b/1. Core Java 8/Day 4/Slides/10. Nested Types and Anonymous Classes/nested-types-and-anonymous-classes-slides.pptx
@@ -7162,54 +7162,6 @@
               <a:cs typeface="Verdana" panose="020B0604030504040204"/>
             </a:endParaRPr>
           </a:p>
-        </p:txBody>
-      </p:sp>
-      <p:sp>
-        <p:nvSpPr>
-          <p:cNvPr id="5" name="object 5"/>
-          <p:cNvSpPr/>
-          <p:nvPr/>
-        </p:nvSpPr>
-        <p:spPr>
-          <a:xfrm>
-            <a:off x="5919619" y="1314196"/>
-            <a:ext cx="3656965" cy="340995"/>
-          </a:xfrm>
-          <a:custGeom>
-            <a:avLst/>
-            <a:gdLst/>
-            <a:ahLst/>
-            <a:cxnLst/>
-            <a:rect l="l" t="t" r="r" b="b"/>
-            <a:pathLst>
-              <a:path w="3656965" h="340994">
-                <a:moveTo>
-                  <a:pt x="3656642" y="0"/>
-                </a:moveTo>
-                <a:lnTo>
-                  <a:pt x="0" y="0"/>
-                </a:lnTo>
-                <a:lnTo>
-                  <a:pt x="0" y="340467"/>
-                </a:lnTo>
-                <a:lnTo>
-                  <a:pt x="3656642" y="340467"/>
-                </a:lnTo>
-                <a:lnTo>
-                  <a:pt x="3656642" y="0"/>
-                </a:lnTo>
-                <a:close/>
-              </a:path>
-            </a:pathLst>
-          </a:custGeom>
-          <a:solidFill>
-            <a:srgbClr val="171717"/>
-          </a:solidFill>
-        </p:spPr>
-        <p:txBody>
-          <a:bodyPr wrap="square" lIns="0" tIns="0" rIns="0" bIns="0" rtlCol="0"/>
-          <a:lstStyle/>
-          <a:p/>
         </p:txBody>
       </p:sp>
       <p:sp>

</xml_diff>